<commit_message>
final updates after the session
</commit_message>
<xml_diff>
--- a/psconfAsia2018/DSC-Workshop/PSConf_Asia-DSC_OVF.pptx
+++ b/psconfAsia2018/DSC-Workshop/PSConf_Asia-DSC_OVF.pptx
@@ -3870,7 +3870,7 @@
         <p:spPr>
           <a:xfrm>
             <a:off x="28576" y="1987163"/>
-            <a:ext cx="4855816" cy="523220"/>
+            <a:ext cx="4855816" cy="954107"/>
           </a:xfrm>
           <a:prstGeom prst="rect">
             <a:avLst/>
@@ -3893,6 +3893,35 @@
               </a:rPr>
               <a:t>Ravikanth Chaganti, Dell EMC</a:t>
             </a:r>
+          </a:p>
+          <a:p>
+            <a:r>
+              <a:rPr lang="en-US" sz="2800" dirty="0">
+                <a:solidFill>
+                  <a:schemeClr val="bg1"/>
+                </a:solidFill>
+                <a:latin typeface="Segoe UI" panose="020B0502040204020203" pitchFamily="34" charset="0"/>
+                <a:cs typeface="Segoe UI" panose="020B0502040204020203" pitchFamily="34" charset="0"/>
+              </a:rPr>
+              <a:t>@</a:t>
+            </a:r>
+            <a:r>
+              <a:rPr lang="en-US" sz="2800" dirty="0" err="1">
+                <a:solidFill>
+                  <a:schemeClr val="bg1"/>
+                </a:solidFill>
+                <a:latin typeface="Segoe UI" panose="020B0502040204020203" pitchFamily="34" charset="0"/>
+                <a:cs typeface="Segoe UI" panose="020B0502040204020203" pitchFamily="34" charset="0"/>
+              </a:rPr>
+              <a:t>ravikanth</a:t>
+            </a:r>
+            <a:endParaRPr lang="en-US" sz="2800" dirty="0">
+              <a:solidFill>
+                <a:schemeClr val="bg1"/>
+              </a:solidFill>
+              <a:latin typeface="Segoe UI" panose="020B0502040204020203" pitchFamily="34" charset="0"/>
+              <a:cs typeface="Segoe UI" panose="020B0502040204020203" pitchFamily="34" charset="0"/>
+            </a:endParaRPr>
           </a:p>
         </p:txBody>
       </p:sp>
@@ -9255,6 +9284,15 @@
 </file>
 
 <file path=customXml/item2.xml><?xml version="1.0" encoding="utf-8"?>
+<?mso-contentType ?>
+<FormTemplates xmlns="http://schemas.microsoft.com/sharepoint/v3/contenttype/forms">
+  <Display>DocumentLibraryForm</Display>
+  <Edit>DocumentLibraryForm</Edit>
+  <New>DocumentLibraryForm</New>
+</FormTemplates>
+</file>
+
+<file path=customXml/item3.xml><?xml version="1.0" encoding="utf-8"?>
 <ct:contentTypeSchema xmlns:ct="http://schemas.microsoft.com/office/2006/metadata/contentType" xmlns:ma="http://schemas.microsoft.com/office/2006/metadata/properties/metaAttributes" ct:_="" ma:_="" ma:contentTypeName="Document" ma:contentTypeID="0x0101000870A200AD61034F824A14E42296AF19" ma:contentTypeVersion="3" ma:contentTypeDescription="Create a new document." ma:contentTypeScope="" ma:versionID="73aacb02c6f81c6cd1259496118e75e6">
   <xsd:schema xmlns:xsd="http://www.w3.org/2001/XMLSchema" xmlns:xs="http://www.w3.org/2001/XMLSchema" xmlns:p="http://schemas.microsoft.com/office/2006/metadata/properties" xmlns:ns2="35430ae4-e281-43de-938c-38a1ecae3204" targetNamespace="http://schemas.microsoft.com/office/2006/metadata/properties" ma:root="true" ma:fieldsID="27565c2e1105912c3783aec573fd6480" ns2:_="">
     <xsd:import namespace="35430ae4-e281-43de-938c-38a1ecae3204"/>
@@ -9392,15 +9430,6 @@
 </ct:contentTypeSchema>
 </file>
 
-<file path=customXml/item3.xml><?xml version="1.0" encoding="utf-8"?>
-<?mso-contentType ?>
-<FormTemplates xmlns="http://schemas.microsoft.com/sharepoint/v3/contenttype/forms">
-  <Display>DocumentLibraryForm</Display>
-  <Edit>DocumentLibraryForm</Edit>
-  <New>DocumentLibraryForm</New>
-</FormTemplates>
-</file>
-
 <file path=customXml/itemProps1.xml><?xml version="1.0" encoding="utf-8"?>
 <ds:datastoreItem xmlns:ds="http://schemas.openxmlformats.org/officeDocument/2006/customXml" ds:itemID="{18C67904-9C10-4B64-B599-8155E7A6B1E6}">
   <ds:schemaRefs>
@@ -9411,6 +9440,14 @@
 </file>
 
 <file path=customXml/itemProps2.xml><?xml version="1.0" encoding="utf-8"?>
+<ds:datastoreItem xmlns:ds="http://schemas.openxmlformats.org/officeDocument/2006/customXml" ds:itemID="{72756391-D205-424A-B5B1-7032AF382F33}">
+  <ds:schemaRefs>
+    <ds:schemaRef ds:uri="http://schemas.microsoft.com/sharepoint/v3/contenttype/forms"/>
+  </ds:schemaRefs>
+</ds:datastoreItem>
+</file>
+
+<file path=customXml/itemProps3.xml><?xml version="1.0" encoding="utf-8"?>
 <ds:datastoreItem xmlns:ds="http://schemas.openxmlformats.org/officeDocument/2006/customXml" ds:itemID="{CBC1BA2F-C324-4101-A7BA-03699E0CB169}">
   <ds:schemaRefs>
     <ds:schemaRef ds:uri="http://schemas.microsoft.com/office/2006/metadata/contentType"/>
@@ -9426,12 +9463,4 @@
     <ds:schemaRef ds:uri="http://schemas.microsoft.com/internal/obd"/>
   </ds:schemaRefs>
 </ds:datastoreItem>
-</file>
-
-<file path=customXml/itemProps3.xml><?xml version="1.0" encoding="utf-8"?>
-<ds:datastoreItem xmlns:ds="http://schemas.openxmlformats.org/officeDocument/2006/customXml" ds:itemID="{72756391-D205-424A-B5B1-7032AF382F33}">
-  <ds:schemaRefs>
-    <ds:schemaRef ds:uri="http://schemas.microsoft.com/sharepoint/v3/contenttype/forms"/>
-  </ds:schemaRefs>
-</ds:datastoreItem>
 </file>
</xml_diff>